<commit_message>
Slides and supporting materials
</commit_message>
<xml_diff>
--- a/Day 3/Slides/Elastic Load Balancing/Elastic Load Balancing.pptx
+++ b/Day 3/Slides/Elastic Load Balancing/Elastic Load Balancing.pptx
@@ -3444,7 +3444,7 @@
           </p:nvPr>
         </p:nvGraphicFramePr>
         <p:xfrm>
-          <a:off x="1039495" y="765810"/>
+          <a:off x="968375" y="365125"/>
           <a:ext cx="10565130" cy="5326380"/>
         </p:xfrm>
         <a:graphic>
@@ -3472,7 +3472,7 @@
                     </p:blipFill>
                     <p:spPr>
                       <a:xfrm>
-                        <a:off x="1039495" y="765810"/>
+                        <a:off x="968375" y="365125"/>
                         <a:ext cx="10565130" cy="5326380"/>
                       </a:xfrm>
                       <a:prstGeom prst="rect">

</xml_diff>